<commit_message>
finished ppt, added test data set
</commit_message>
<xml_diff>
--- a/intro.pptx
+++ b/intro.pptx
@@ -10,6 +10,7 @@
     <p:sldId id="260" r:id="rId4"/>
     <p:sldId id="262" r:id="rId5"/>
     <p:sldId id="261" r:id="rId6"/>
+    <p:sldId id="263" r:id="rId7"/>
   </p:sldIdLst>
   <p:sldSz cx="12192000" cy="6858000"/>
   <p:notesSz cx="6858000" cy="9144000"/>
@@ -108,6 +109,11 @@
       </a:defRPr>
     </a:lvl9pPr>
   </p:defaultTextStyle>
+  <p:extLst>
+    <p:ext uri="{EFAFB233-063F-42B5-8137-9DF3F51BA10A}">
+      <p15:sldGuideLst xmlns:p15="http://schemas.microsoft.com/office/powerpoint/2012/main"/>
+    </p:ext>
+  </p:extLst>
 </p:presentation>
 </file>
 
@@ -3521,7 +3527,11 @@
             </a:pPr>
             <a:r>
               <a:rPr lang="en-US" dirty="0" smtClean="0"/>
-              <a:t>Greenland Ice Sheet</a:t>
+              <a:t>Model the Greenland </a:t>
+            </a:r>
+            <a:r>
+              <a:rPr lang="en-US" dirty="0" smtClean="0"/>
+              <a:t>Ice Sheet</a:t>
             </a:r>
           </a:p>
           <a:p>
@@ -3532,8 +3542,32 @@
             </a:pPr>
             <a:r>
               <a:rPr lang="en-US" dirty="0" smtClean="0"/>
-              <a:t>View model in the browser</a:t>
-            </a:r>
+              <a:t>View </a:t>
+            </a:r>
+            <a:r>
+              <a:rPr lang="en-US" dirty="0" smtClean="0"/>
+              <a:t>3D model </a:t>
+            </a:r>
+            <a:r>
+              <a:rPr lang="en-US" dirty="0" smtClean="0"/>
+              <a:t>in the </a:t>
+            </a:r>
+            <a:r>
+              <a:rPr lang="en-US" dirty="0" smtClean="0"/>
+              <a:t>browser</a:t>
+            </a:r>
+          </a:p>
+          <a:p>
+            <a:pPr>
+              <a:lnSpc>
+                <a:spcPct val="150000"/>
+              </a:lnSpc>
+            </a:pPr>
+            <a:r>
+              <a:rPr lang="en-US" dirty="0" smtClean="0"/>
+              <a:t>Three.js</a:t>
+            </a:r>
+            <a:endParaRPr lang="en-US" dirty="0" smtClean="0"/>
           </a:p>
           <a:p>
             <a:pPr>
@@ -3619,18 +3653,23 @@
             <p:ph idx="1"/>
           </p:nvPr>
         </p:nvSpPr>
-        <p:spPr/>
+        <p:spPr>
+          <a:xfrm>
+            <a:off x="1261872" y="2343955"/>
+            <a:ext cx="8595360" cy="3836182"/>
+          </a:xfrm>
+        </p:spPr>
         <p:txBody>
           <a:bodyPr/>
           <a:lstStyle/>
           <a:p>
             <a:r>
               <a:rPr lang="en-US" dirty="0" smtClean="0"/>
-              <a:t>.</a:t>
+              <a:t>Research Model gives </a:t>
             </a:r>
             <a:r>
               <a:rPr lang="en-US" dirty="0" err="1" smtClean="0"/>
-              <a:t>pvd</a:t>
+              <a:t>vtk</a:t>
             </a:r>
             <a:r>
               <a:rPr lang="en-US" dirty="0" smtClean="0"/>
@@ -3638,15 +3677,53 @@
             </a:r>
           </a:p>
           <a:p>
+            <a:pPr lvl="1"/>
             <a:r>
               <a:rPr lang="en-US" dirty="0" smtClean="0"/>
-              <a:t>Xml based</a:t>
-            </a:r>
-          </a:p>
-          <a:p>
+              <a:t>Visualization toolkit</a:t>
+            </a:r>
+          </a:p>
+          <a:p>
+            <a:pPr lvl="1"/>
             <a:r>
               <a:rPr lang="en-US" dirty="0" smtClean="0"/>
-              <a:t>27,500 data points!</a:t>
+              <a:t>XML based</a:t>
+            </a:r>
+          </a:p>
+          <a:p>
+            <a:pPr lvl="2"/>
+            <a:r>
+              <a:rPr lang="en-US" dirty="0" smtClean="0"/>
+              <a:t>Unstructured grid data type (.</a:t>
+            </a:r>
+            <a:r>
+              <a:rPr lang="en-US" dirty="0" err="1" smtClean="0"/>
+              <a:t>vtu</a:t>
+            </a:r>
+            <a:r>
+              <a:rPr lang="en-US" dirty="0" smtClean="0"/>
+              <a:t>)</a:t>
+            </a:r>
+          </a:p>
+          <a:p>
+            <a:r>
+              <a:rPr lang="en-US" dirty="0" err="1" smtClean="0"/>
+              <a:t>ParaView</a:t>
+            </a:r>
+            <a:endParaRPr lang="en-US" dirty="0" smtClean="0"/>
+          </a:p>
+          <a:p>
+            <a:r>
+              <a:rPr lang="en-US" dirty="0" smtClean="0"/>
+              <a:t>27,500 </a:t>
+            </a:r>
+            <a:r>
+              <a:rPr lang="en-US" dirty="0" smtClean="0"/>
+              <a:t>data </a:t>
+            </a:r>
+            <a:r>
+              <a:rPr lang="en-US" dirty="0" smtClean="0"/>
+              <a:t>points, 56,000 cells!</a:t>
             </a:r>
             <a:endParaRPr lang="en-US" dirty="0"/>
           </a:p>
@@ -3724,6 +3801,10 @@
           <a:bodyPr/>
           <a:lstStyle/>
           <a:p>
+            <a:r>
+              <a:rPr lang="en-US" dirty="0" smtClean="0"/>
+              <a:t>This will be our target output, as well as test data</a:t>
+            </a:r>
             <a:endParaRPr lang="en-US" dirty="0"/>
           </a:p>
         </p:txBody>
@@ -3860,18 +3941,27 @@
           <a:p>
             <a:r>
               <a:rPr lang="en-US" dirty="0"/>
-              <a:t>c</a:t>
+              <a:t>C</a:t>
             </a:r>
             <a:r>
               <a:rPr lang="en-US" dirty="0" smtClean="0"/>
-              <a:t>lick and drag interaction</a:t>
-            </a:r>
-          </a:p>
-          <a:p>
+              <a:t>lick </a:t>
+            </a:r>
             <a:r>
               <a:rPr lang="en-US" dirty="0" smtClean="0"/>
-              <a:t>colorized</a:t>
-            </a:r>
+              <a:t>and drag interaction</a:t>
+            </a:r>
+          </a:p>
+          <a:p>
+            <a:r>
+              <a:rPr lang="en-US" dirty="0"/>
+              <a:t>C</a:t>
+            </a:r>
+            <a:r>
+              <a:rPr lang="en-US" dirty="0" smtClean="0"/>
+              <a:t>olorized</a:t>
+            </a:r>
+            <a:endParaRPr lang="en-US" dirty="0" smtClean="0"/>
           </a:p>
           <a:p>
             <a:r>
@@ -3924,23 +4014,60 @@
           <a:p>
             <a:r>
               <a:rPr lang="en-US" dirty="0" smtClean="0"/>
-              <a:t>Pre-process xml data</a:t>
-            </a:r>
-          </a:p>
-          <a:p>
+              <a:t>Pre-process </a:t>
+            </a:r>
             <a:r>
               <a:rPr lang="en-US" dirty="0" smtClean="0"/>
-              <a:t>implement a strategy for optimization</a:t>
-            </a:r>
-          </a:p>
-          <a:p>
-            <a:r>
-              <a:rPr lang="en-US" dirty="0" err="1" smtClean="0"/>
-              <a:t>ThreeJs</a:t>
+              <a:t>the data</a:t>
+            </a:r>
+          </a:p>
+          <a:p>
+            <a:pPr marL="457200" lvl="2">
+              <a:lnSpc>
+                <a:spcPct val="95000"/>
+              </a:lnSpc>
+              <a:spcBef>
+                <a:spcPts val="1400"/>
+              </a:spcBef>
+              <a:spcAft>
+                <a:spcPts val="200"/>
+              </a:spcAft>
+              <a:buSzPct val="80000"/>
+              <a:buFont typeface="Arial" pitchFamily="34" charset="0"/>
+              <a:buChar char="•"/>
+            </a:pPr>
+            <a:r>
+              <a:rPr lang="en-US" dirty="0"/>
+              <a:t>Possibly convert the </a:t>
             </a:r>
             <a:r>
               <a:rPr lang="en-US" dirty="0" smtClean="0"/>
-              <a:t> framework, manipulate camera perspective </a:t>
+              <a:t>format</a:t>
+            </a:r>
+            <a:endParaRPr lang="en-US" dirty="0" smtClean="0"/>
+          </a:p>
+          <a:p>
+            <a:r>
+              <a:rPr lang="en-US" dirty="0"/>
+              <a:t>I</a:t>
+            </a:r>
+            <a:r>
+              <a:rPr lang="en-US" dirty="0" smtClean="0"/>
+              <a:t>mplement </a:t>
+            </a:r>
+            <a:r>
+              <a:rPr lang="en-US" dirty="0" smtClean="0"/>
+              <a:t>a strategy for </a:t>
+            </a:r>
+            <a:r>
+              <a:rPr lang="en-US" dirty="0" smtClean="0"/>
+              <a:t>optimization</a:t>
+            </a:r>
+          </a:p>
+          <a:p>
+            <a:r>
+              <a:rPr lang="en-US" dirty="0" smtClean="0"/>
+              <a:t>Load using Three.js</a:t>
             </a:r>
             <a:endParaRPr lang="en-US" dirty="0"/>
           </a:p>
@@ -3950,6 +4077,122 @@
     <p:extLst>
       <p:ext uri="{BB962C8B-B14F-4D97-AF65-F5344CB8AC3E}">
         <p14:creationId xmlns:p14="http://schemas.microsoft.com/office/powerpoint/2010/main" val="775639342"/>
+      </p:ext>
+    </p:extLst>
+  </p:cSld>
+  <p:clrMapOvr>
+    <a:masterClrMapping/>
+  </p:clrMapOvr>
+</p:sld>
+</file>
+
+<file path=ppt/slides/slide6.xml><?xml version="1.0" encoding="utf-8"?>
+<p:sld xmlns:a="http://schemas.openxmlformats.org/drawingml/2006/main" xmlns:r="http://schemas.openxmlformats.org/officeDocument/2006/relationships" xmlns:p="http://schemas.openxmlformats.org/presentationml/2006/main">
+  <p:cSld>
+    <p:spTree>
+      <p:nvGrpSpPr>
+        <p:cNvPr id="1" name=""/>
+        <p:cNvGrpSpPr/>
+        <p:nvPr/>
+      </p:nvGrpSpPr>
+      <p:grpSpPr>
+        <a:xfrm>
+          <a:off x="0" y="0"/>
+          <a:ext cx="0" cy="0"/>
+          <a:chOff x="0" y="0"/>
+          <a:chExt cx="0" cy="0"/>
+        </a:xfrm>
+      </p:grpSpPr>
+      <p:sp>
+        <p:nvSpPr>
+          <p:cNvPr id="3" name="Title 2"/>
+          <p:cNvSpPr>
+            <a:spLocks noGrp="1"/>
+          </p:cNvSpPr>
+          <p:nvPr>
+            <p:ph type="title"/>
+          </p:nvPr>
+        </p:nvSpPr>
+        <p:spPr/>
+        <p:txBody>
+          <a:bodyPr/>
+          <a:lstStyle/>
+          <a:p>
+            <a:r>
+              <a:rPr lang="en-US" dirty="0" smtClean="0"/>
+              <a:t>Links</a:t>
+            </a:r>
+            <a:endParaRPr lang="en-US" dirty="0"/>
+          </a:p>
+        </p:txBody>
+      </p:sp>
+      <p:sp>
+        <p:nvSpPr>
+          <p:cNvPr id="5" name="Content Placeholder 4"/>
+          <p:cNvSpPr txBox="1">
+            <a:spLocks noGrp="1"/>
+          </p:cNvSpPr>
+          <p:nvPr>
+            <p:ph idx="1"/>
+          </p:nvPr>
+        </p:nvSpPr>
+        <p:spPr>
+          <a:xfrm>
+            <a:off x="1261872" y="1974658"/>
+            <a:ext cx="8595360" cy="4351337"/>
+          </a:xfrm>
+          <a:prstGeom prst="rect">
+            <a:avLst/>
+          </a:prstGeom>
+          <a:noFill/>
+        </p:spPr>
+        <p:txBody>
+          <a:bodyPr wrap="none" rtlCol="0">
+            <a:spAutoFit/>
+          </a:bodyPr>
+          <a:lstStyle/>
+          <a:p>
+            <a:r>
+              <a:rPr lang="en-US" dirty="0">
+                <a:hlinkClick r:id="rId2"/>
+              </a:rPr>
+              <a:t>http://threejs.org/examples/#</a:t>
+            </a:r>
+            <a:r>
+              <a:rPr lang="en-US" dirty="0" smtClean="0">
+                <a:hlinkClick r:id="rId2"/>
+              </a:rPr>
+              <a:t>webgl_loader_vtk</a:t>
+            </a:r>
+            <a:endParaRPr lang="en-US" dirty="0" smtClean="0"/>
+          </a:p>
+          <a:p>
+            <a:endParaRPr lang="en-US" dirty="0"/>
+          </a:p>
+          <a:p>
+            <a:r>
+              <a:rPr lang="en-US" dirty="0">
+                <a:hlinkClick r:id="rId3"/>
+              </a:rPr>
+              <a:t>https://</a:t>
+            </a:r>
+            <a:r>
+              <a:rPr lang="en-US" dirty="0" smtClean="0">
+                <a:hlinkClick r:id="rId3"/>
+              </a:rPr>
+              <a:t>trello.com/b/eh9u8ENn/adv-web-project-timeline</a:t>
+            </a:r>
+            <a:endParaRPr lang="en-US" dirty="0" smtClean="0"/>
+          </a:p>
+          <a:p>
+            <a:endParaRPr lang="en-US" dirty="0"/>
+          </a:p>
+        </p:txBody>
+      </p:sp>
+    </p:spTree>
+    <p:extLst>
+      <p:ext uri="{BB962C8B-B14F-4D97-AF65-F5344CB8AC3E}">
+        <p14:creationId xmlns:p14="http://schemas.microsoft.com/office/powerpoint/2010/main" val="4063860180"/>
       </p:ext>
     </p:extLst>
   </p:cSld>

</xml_diff>